<commit_message>
Fixed the packages wrapper idiom
</commit_message>
<xml_diff>
--- a/idioms/packages-and-reports/wrapper/diagram.pptx
+++ b/idioms/packages-and-reports/wrapper/diagram.pptx
@@ -288,7 +288,7 @@
           <a:p>
             <a:fld id="{13F24B86-36D2-4655-BE2F-98B661AC85E1}" type="datetimeFigureOut">
               <a:rPr lang="en-US" smtClean="0"/>
-              <a:t>3/25/2014</a:t>
+              <a:t>3/31/2014</a:t>
             </a:fld>
             <a:endParaRPr lang="en-US"/>
           </a:p>
@@ -458,7 +458,7 @@
           <a:p>
             <a:fld id="{13F24B86-36D2-4655-BE2F-98B661AC85E1}" type="datetimeFigureOut">
               <a:rPr lang="en-US" smtClean="0"/>
-              <a:t>3/25/2014</a:t>
+              <a:t>3/31/2014</a:t>
             </a:fld>
             <a:endParaRPr lang="en-US"/>
           </a:p>
@@ -638,7 +638,7 @@
           <a:p>
             <a:fld id="{13F24B86-36D2-4655-BE2F-98B661AC85E1}" type="datetimeFigureOut">
               <a:rPr lang="en-US" smtClean="0"/>
-              <a:t>3/25/2014</a:t>
+              <a:t>3/31/2014</a:t>
             </a:fld>
             <a:endParaRPr lang="en-US"/>
           </a:p>
@@ -808,7 +808,7 @@
           <a:p>
             <a:fld id="{13F24B86-36D2-4655-BE2F-98B661AC85E1}" type="datetimeFigureOut">
               <a:rPr lang="en-US" smtClean="0"/>
-              <a:t>3/25/2014</a:t>
+              <a:t>3/31/2014</a:t>
             </a:fld>
             <a:endParaRPr lang="en-US"/>
           </a:p>
@@ -1054,7 +1054,7 @@
           <a:p>
             <a:fld id="{13F24B86-36D2-4655-BE2F-98B661AC85E1}" type="datetimeFigureOut">
               <a:rPr lang="en-US" smtClean="0"/>
-              <a:t>3/25/2014</a:t>
+              <a:t>3/31/2014</a:t>
             </a:fld>
             <a:endParaRPr lang="en-US"/>
           </a:p>
@@ -1342,7 +1342,7 @@
           <a:p>
             <a:fld id="{13F24B86-36D2-4655-BE2F-98B661AC85E1}" type="datetimeFigureOut">
               <a:rPr lang="en-US" smtClean="0"/>
-              <a:t>3/25/2014</a:t>
+              <a:t>3/31/2014</a:t>
             </a:fld>
             <a:endParaRPr lang="en-US"/>
           </a:p>
@@ -1764,7 +1764,7 @@
           <a:p>
             <a:fld id="{13F24B86-36D2-4655-BE2F-98B661AC85E1}" type="datetimeFigureOut">
               <a:rPr lang="en-US" smtClean="0"/>
-              <a:t>3/25/2014</a:t>
+              <a:t>3/31/2014</a:t>
             </a:fld>
             <a:endParaRPr lang="en-US"/>
           </a:p>
@@ -1882,7 +1882,7 @@
           <a:p>
             <a:fld id="{13F24B86-36D2-4655-BE2F-98B661AC85E1}" type="datetimeFigureOut">
               <a:rPr lang="en-US" smtClean="0"/>
-              <a:t>3/25/2014</a:t>
+              <a:t>3/31/2014</a:t>
             </a:fld>
             <a:endParaRPr lang="en-US"/>
           </a:p>
@@ -1977,7 +1977,7 @@
           <a:p>
             <a:fld id="{13F24B86-36D2-4655-BE2F-98B661AC85E1}" type="datetimeFigureOut">
               <a:rPr lang="en-US" smtClean="0"/>
-              <a:t>3/25/2014</a:t>
+              <a:t>3/31/2014</a:t>
             </a:fld>
             <a:endParaRPr lang="en-US"/>
           </a:p>
@@ -2254,7 +2254,7 @@
           <a:p>
             <a:fld id="{13F24B86-36D2-4655-BE2F-98B661AC85E1}" type="datetimeFigureOut">
               <a:rPr lang="en-US" smtClean="0"/>
-              <a:t>3/25/2014</a:t>
+              <a:t>3/31/2014</a:t>
             </a:fld>
             <a:endParaRPr lang="en-US"/>
           </a:p>
@@ -2507,7 +2507,7 @@
           <a:p>
             <a:fld id="{13F24B86-36D2-4655-BE2F-98B661AC85E1}" type="datetimeFigureOut">
               <a:rPr lang="en-US" smtClean="0"/>
-              <a:t>3/25/2014</a:t>
+              <a:t>3/31/2014</a:t>
             </a:fld>
             <a:endParaRPr lang="en-US"/>
           </a:p>
@@ -2720,7 +2720,7 @@
           <a:p>
             <a:fld id="{13F24B86-36D2-4655-BE2F-98B661AC85E1}" type="datetimeFigureOut">
               <a:rPr lang="en-US" smtClean="0"/>
-              <a:t>3/25/2014</a:t>
+              <a:t>3/31/2014</a:t>
             </a:fld>
             <a:endParaRPr lang="en-US"/>
           </a:p>
@@ -3104,14 +3104,14 @@
           <p:nvPr>
             <p:extLst>
               <p:ext uri="{D42A27DB-BD31-4B8C-83A1-F6EECF244321}">
-                <p14:modId xmlns:p14="http://schemas.microsoft.com/office/powerpoint/2010/main" val="2878814897"/>
+                <p14:modId xmlns:p14="http://schemas.microsoft.com/office/powerpoint/2010/main" val="1760519386"/>
               </p:ext>
             </p:extLst>
           </p:nvPr>
         </p:nvGraphicFramePr>
         <p:xfrm>
-          <a:off x="431256" y="312381"/>
-          <a:ext cx="6960145" cy="5669280"/>
+          <a:off x="431256" y="140931"/>
+          <a:ext cx="7769769" cy="6964680"/>
         </p:xfrm>
         <a:graphic>
           <a:graphicData uri="http://schemas.openxmlformats.org/drawingml/2006/table">
@@ -3120,12 +3120,13 @@
                 <a:tableStyleId>{5C22544A-7EE6-4342-B048-85BDC9FD1C3A}</a:tableStyleId>
               </a:tblPr>
               <a:tblGrid>
-                <a:gridCol w="1302294"/>
-                <a:gridCol w="1895475"/>
-                <a:gridCol w="3762376"/>
+                <a:gridCol w="1453781"/>
+                <a:gridCol w="1829713"/>
+                <a:gridCol w="2386262"/>
+                <a:gridCol w="2100013"/>
               </a:tblGrid>
               <a:tr h="0">
-                <a:tc gridSpan="3">
+                <a:tc gridSpan="4">
                   <a:txBody>
                     <a:bodyPr/>
                     <a:lstStyle/>
@@ -3227,48 +3228,20 @@
                     <a:bodyPr/>
                     <a:lstStyle/>
                     <a:p>
-                      <a:pPr algn="ctr"/>
-                      <a:endParaRPr lang="en-US" sz="1600" b="1" dirty="0">
-                        <a:solidFill>
-                          <a:schemeClr val="bg1"/>
-                        </a:solidFill>
-                      </a:endParaRPr>
-                    </a:p>
-                  </a:txBody>
-                  <a:tcPr>
-                    <a:lnL w="12700" cap="flat" cmpd="sng" algn="ctr">
-                      <a:solidFill>
-                        <a:schemeClr val="tx1"/>
-                      </a:solidFill>
-                      <a:prstDash val="solid"/>
-                      <a:round/>
-                      <a:headEnd type="none" w="med" len="med"/>
-                      <a:tailEnd type="none" w="med" len="med"/>
-                    </a:lnL>
-                    <a:lnR w="12700" cap="flat" cmpd="sng" algn="ctr">
-                      <a:solidFill>
-                        <a:schemeClr val="tx1"/>
-                      </a:solidFill>
-                      <a:prstDash val="solid"/>
-                      <a:round/>
-                      <a:headEnd type="none" w="med" len="med"/>
-                      <a:tailEnd type="none" w="med" len="med"/>
-                    </a:lnR>
-                    <a:lnT w="12700" cap="flat" cmpd="sng" algn="ctr">
-                      <a:solidFill>
-                        <a:schemeClr val="tx1"/>
-                      </a:solidFill>
-                      <a:prstDash val="solid"/>
-                      <a:round/>
-                      <a:headEnd type="none" w="med" len="med"/>
-                      <a:tailEnd type="none" w="med" len="med"/>
-                    </a:lnT>
-                    <a:solidFill>
-                      <a:schemeClr val="accent1">
-                        <a:lumMod val="75000"/>
-                      </a:schemeClr>
-                    </a:solidFill>
-                  </a:tcPr>
+                      <a:endParaRPr lang="en-US"/>
+                    </a:p>
+                  </a:txBody>
+                  <a:tcPr/>
+                </a:tc>
+                <a:tc hMerge="1">
+                  <a:txBody>
+                    <a:bodyPr/>
+                    <a:lstStyle/>
+                    <a:p>
+                      <a:endParaRPr lang="en-US"/>
+                    </a:p>
+                  </a:txBody>
+                  <a:tcPr/>
                 </a:tc>
               </a:tr>
               <a:tr h="0">
@@ -3305,7 +3278,7 @@
                     </a:lnR>
                   </a:tcPr>
                 </a:tc>
-                <a:tc gridSpan="2">
+                <a:tc gridSpan="3">
                   <a:txBody>
                     <a:bodyPr/>
                     <a:lstStyle/>
@@ -3349,7 +3322,37 @@
                     <a:bodyPr/>
                     <a:lstStyle/>
                     <a:p>
-                      <a:endParaRPr lang="en-US" sz="1100" dirty="0" smtClean="0"/>
+                      <a:endParaRPr lang="en-US"/>
+                    </a:p>
+                  </a:txBody>
+                  <a:tcPr/>
+                </a:tc>
+                <a:tc hMerge="1">
+                  <a:txBody>
+                    <a:bodyPr/>
+                    <a:lstStyle/>
+                    <a:p>
+                      <a:endParaRPr lang="en-US"/>
+                    </a:p>
+                  </a:txBody>
+                  <a:tcPr/>
+                </a:tc>
+              </a:tr>
+              <a:tr h="0">
+                <a:tc>
+                  <a:txBody>
+                    <a:bodyPr/>
+                    <a:lstStyle/>
+                    <a:p>
+                      <a:r>
+                        <a:rPr lang="en-US" sz="1100" b="0" dirty="0" smtClean="0"/>
+                        <a:t>STIX</a:t>
+                      </a:r>
+                      <a:r>
+                        <a:rPr lang="en-US" sz="1100" b="0" baseline="0" dirty="0" smtClean="0"/>
+                        <a:t> Header</a:t>
+                      </a:r>
+                      <a:endParaRPr lang="en-US" sz="1100" b="0" dirty="0"/>
                     </a:p>
                   </a:txBody>
                   <a:tcPr>
@@ -3371,6 +3374,42 @@
                       <a:headEnd type="none" w="med" len="med"/>
                       <a:tailEnd type="none" w="med" len="med"/>
                     </a:lnR>
+                  </a:tcPr>
+                </a:tc>
+                <a:tc gridSpan="3">
+                  <a:txBody>
+                    <a:bodyPr/>
+                    <a:lstStyle/>
+                    <a:p>
+                      <a:endParaRPr lang="en-US" sz="1100" dirty="0" smtClean="0"/>
+                    </a:p>
+                  </a:txBody>
+                  <a:tcPr>
+                    <a:lnL w="12700" cap="flat" cmpd="sng" algn="ctr">
+                      <a:solidFill>
+                        <a:schemeClr val="tx1"/>
+                      </a:solidFill>
+                      <a:prstDash val="solid"/>
+                      <a:round/>
+                      <a:headEnd type="none" w="med" len="med"/>
+                      <a:tailEnd type="none" w="med" len="med"/>
+                    </a:lnL>
+                    <a:lnR w="12700" cap="flat" cmpd="sng" algn="ctr">
+                      <a:solidFill>
+                        <a:schemeClr val="tx1"/>
+                      </a:solidFill>
+                      <a:prstDash val="solid"/>
+                      <a:round/>
+                      <a:headEnd type="none" w="med" len="med"/>
+                      <a:tailEnd type="none" w="med" len="med"/>
+                    </a:lnR>
+                    <a:lnT w="12700" cap="flat" cmpd="sng" algn="ctr">
+                      <a:noFill/>
+                      <a:prstDash val="solid"/>
+                      <a:round/>
+                      <a:headEnd type="none" w="med" len="med"/>
+                      <a:tailEnd type="none" w="med" len="med"/>
+                    </a:lnT>
                     <a:lnB w="12700" cap="flat" cmpd="sng" algn="ctr">
                       <a:noFill/>
                       <a:prstDash val="solid"/>
@@ -3378,7 +3417,262 @@
                       <a:headEnd type="none" w="med" len="med"/>
                       <a:tailEnd type="none" w="med" len="med"/>
                     </a:lnB>
+                    <a:lnTlToBr w="12700" cmpd="sng">
+                      <a:noFill/>
+                      <a:prstDash val="solid"/>
+                    </a:lnTlToBr>
+                    <a:lnBlToTr w="12700" cmpd="sng">
+                      <a:noFill/>
+                      <a:prstDash val="solid"/>
+                    </a:lnBlToTr>
                   </a:tcPr>
+                </a:tc>
+                <a:tc hMerge="1">
+                  <a:txBody>
+                    <a:bodyPr/>
+                    <a:lstStyle/>
+                    <a:p>
+                      <a:endParaRPr lang="en-US"/>
+                    </a:p>
+                  </a:txBody>
+                  <a:tcPr/>
+                </a:tc>
+                <a:tc hMerge="1">
+                  <a:txBody>
+                    <a:bodyPr/>
+                    <a:lstStyle/>
+                    <a:p>
+                      <a:endParaRPr lang="en-US"/>
+                    </a:p>
+                  </a:txBody>
+                  <a:tcPr/>
+                </a:tc>
+              </a:tr>
+              <a:tr h="0">
+                <a:tc>
+                  <a:txBody>
+                    <a:bodyPr/>
+                    <a:lstStyle/>
+                    <a:p>
+                      <a:r>
+                        <a:rPr lang="en-US" sz="1100" b="0" dirty="0" smtClean="0"/>
+                        <a:t>    Identity</a:t>
+                      </a:r>
+                      <a:endParaRPr lang="en-US" sz="1100" b="0" dirty="0"/>
+                    </a:p>
+                  </a:txBody>
+                  <a:tcPr>
+                    <a:lnL w="12700" cap="flat" cmpd="sng" algn="ctr">
+                      <a:solidFill>
+                        <a:schemeClr val="tx1"/>
+                      </a:solidFill>
+                      <a:prstDash val="solid"/>
+                      <a:round/>
+                      <a:headEnd type="none" w="med" len="med"/>
+                      <a:tailEnd type="none" w="med" len="med"/>
+                    </a:lnL>
+                    <a:lnR w="12700" cap="flat" cmpd="sng" algn="ctr">
+                      <a:solidFill>
+                        <a:schemeClr val="tx1"/>
+                      </a:solidFill>
+                      <a:prstDash val="solid"/>
+                      <a:round/>
+                      <a:headEnd type="none" w="med" len="med"/>
+                      <a:tailEnd type="none" w="med" len="med"/>
+                    </a:lnR>
+                  </a:tcPr>
+                </a:tc>
+                <a:tc gridSpan="3">
+                  <a:txBody>
+                    <a:bodyPr/>
+                    <a:lstStyle/>
+                    <a:p>
+                      <a:pPr algn="r"/>
+                      <a:r>
+                        <a:rPr lang="en-US" sz="1100" b="0" dirty="0" err="1" smtClean="0">
+                          <a:solidFill>
+                            <a:schemeClr val="bg1">
+                              <a:lumMod val="50000"/>
+                            </a:schemeClr>
+                          </a:solidFill>
+                        </a:rPr>
+                        <a:t>IdentityType</a:t>
+                      </a:r>
+                      <a:endParaRPr lang="en-US" sz="1100" dirty="0" smtClean="0"/>
+                    </a:p>
+                  </a:txBody>
+                  <a:tcPr>
+                    <a:lnL w="12700" cap="flat" cmpd="sng" algn="ctr">
+                      <a:solidFill>
+                        <a:schemeClr val="tx1"/>
+                      </a:solidFill>
+                      <a:prstDash val="solid"/>
+                      <a:round/>
+                      <a:headEnd type="none" w="med" len="med"/>
+                      <a:tailEnd type="none" w="med" len="med"/>
+                    </a:lnL>
+                    <a:lnR w="12700" cap="flat" cmpd="sng" algn="ctr">
+                      <a:solidFill>
+                        <a:schemeClr val="tx1"/>
+                      </a:solidFill>
+                      <a:prstDash val="solid"/>
+                      <a:round/>
+                      <a:headEnd type="none" w="med" len="med"/>
+                      <a:tailEnd type="none" w="med" len="med"/>
+                    </a:lnR>
+                    <a:lnT w="12700" cap="flat" cmpd="sng" algn="ctr">
+                      <a:noFill/>
+                      <a:prstDash val="solid"/>
+                      <a:round/>
+                      <a:headEnd type="none" w="med" len="med"/>
+                      <a:tailEnd type="none" w="med" len="med"/>
+                    </a:lnT>
+                    <a:lnB w="12700" cap="flat" cmpd="sng" algn="ctr">
+                      <a:noFill/>
+                      <a:prstDash val="solid"/>
+                      <a:round/>
+                      <a:headEnd type="none" w="med" len="med"/>
+                      <a:tailEnd type="none" w="med" len="med"/>
+                    </a:lnB>
+                    <a:lnTlToBr w="12700" cmpd="sng">
+                      <a:noFill/>
+                      <a:prstDash val="solid"/>
+                    </a:lnTlToBr>
+                    <a:lnBlToTr w="12700" cmpd="sng">
+                      <a:noFill/>
+                      <a:prstDash val="solid"/>
+                    </a:lnBlToTr>
+                  </a:tcPr>
+                </a:tc>
+                <a:tc hMerge="1">
+                  <a:txBody>
+                    <a:bodyPr/>
+                    <a:lstStyle/>
+                    <a:p>
+                      <a:endParaRPr lang="en-US"/>
+                    </a:p>
+                  </a:txBody>
+                  <a:tcPr/>
+                </a:tc>
+                <a:tc hMerge="1">
+                  <a:txBody>
+                    <a:bodyPr/>
+                    <a:lstStyle/>
+                    <a:p>
+                      <a:endParaRPr lang="en-US"/>
+                    </a:p>
+                  </a:txBody>
+                  <a:tcPr/>
+                </a:tc>
+              </a:tr>
+              <a:tr h="0">
+                <a:tc>
+                  <a:txBody>
+                    <a:bodyPr/>
+                    <a:lstStyle/>
+                    <a:p>
+                      <a:r>
+                        <a:rPr lang="en-US" sz="1100" b="0" dirty="0" smtClean="0"/>
+                        <a:t>        Name</a:t>
+                      </a:r>
+                      <a:endParaRPr lang="en-US" sz="1100" b="0" dirty="0"/>
+                    </a:p>
+                  </a:txBody>
+                  <a:tcPr>
+                    <a:lnL w="12700" cap="flat" cmpd="sng" algn="ctr">
+                      <a:solidFill>
+                        <a:schemeClr val="tx1"/>
+                      </a:solidFill>
+                      <a:prstDash val="solid"/>
+                      <a:round/>
+                      <a:headEnd type="none" w="med" len="med"/>
+                      <a:tailEnd type="none" w="med" len="med"/>
+                    </a:lnL>
+                    <a:lnR w="12700" cap="flat" cmpd="sng" algn="ctr">
+                      <a:solidFill>
+                        <a:schemeClr val="tx1"/>
+                      </a:solidFill>
+                      <a:prstDash val="solid"/>
+                      <a:round/>
+                      <a:headEnd type="none" w="med" len="med"/>
+                      <a:tailEnd type="none" w="med" len="med"/>
+                    </a:lnR>
+                  </a:tcPr>
+                </a:tc>
+                <a:tc gridSpan="3">
+                  <a:txBody>
+                    <a:bodyPr/>
+                    <a:lstStyle/>
+                    <a:p>
+                      <a:r>
+                        <a:rPr lang="en-US" sz="1100" dirty="0" smtClean="0"/>
+                        <a:t>Government Sharing Program - GSP</a:t>
+                      </a:r>
+                      <a:endParaRPr lang="en-US" sz="1100" dirty="0" smtClean="0"/>
+                    </a:p>
+                  </a:txBody>
+                  <a:tcPr>
+                    <a:lnL w="12700" cap="flat" cmpd="sng" algn="ctr">
+                      <a:solidFill>
+                        <a:schemeClr val="tx1"/>
+                      </a:solidFill>
+                      <a:prstDash val="solid"/>
+                      <a:round/>
+                      <a:headEnd type="none" w="med" len="med"/>
+                      <a:tailEnd type="none" w="med" len="med"/>
+                    </a:lnL>
+                    <a:lnR w="12700" cap="flat" cmpd="sng" algn="ctr">
+                      <a:solidFill>
+                        <a:schemeClr val="tx1"/>
+                      </a:solidFill>
+                      <a:prstDash val="solid"/>
+                      <a:round/>
+                      <a:headEnd type="none" w="med" len="med"/>
+                      <a:tailEnd type="none" w="med" len="med"/>
+                    </a:lnR>
+                    <a:lnT w="12700" cap="flat" cmpd="sng" algn="ctr">
+                      <a:noFill/>
+                      <a:prstDash val="solid"/>
+                      <a:round/>
+                      <a:headEnd type="none" w="med" len="med"/>
+                      <a:tailEnd type="none" w="med" len="med"/>
+                    </a:lnT>
+                    <a:lnB w="12700" cap="flat" cmpd="sng" algn="ctr">
+                      <a:noFill/>
+                      <a:prstDash val="solid"/>
+                      <a:round/>
+                      <a:headEnd type="none" w="med" len="med"/>
+                      <a:tailEnd type="none" w="med" len="med"/>
+                    </a:lnB>
+                    <a:lnTlToBr w="12700" cmpd="sng">
+                      <a:noFill/>
+                      <a:prstDash val="solid"/>
+                    </a:lnTlToBr>
+                    <a:lnBlToTr w="12700" cmpd="sng">
+                      <a:noFill/>
+                      <a:prstDash val="solid"/>
+                    </a:lnBlToTr>
+                  </a:tcPr>
+                </a:tc>
+                <a:tc hMerge="1">
+                  <a:txBody>
+                    <a:bodyPr/>
+                    <a:lstStyle/>
+                    <a:p>
+                      <a:endParaRPr lang="en-US"/>
+                    </a:p>
+                  </a:txBody>
+                  <a:tcPr/>
+                </a:tc>
+                <a:tc hMerge="1">
+                  <a:txBody>
+                    <a:bodyPr/>
+                    <a:lstStyle/>
+                    <a:p>
+                      <a:endParaRPr lang="en-US"/>
+                    </a:p>
+                  </a:txBody>
+                  <a:tcPr/>
                 </a:tc>
               </a:tr>
               <a:tr h="0">
@@ -3415,7 +3709,7 @@
                     </a:lnR>
                   </a:tcPr>
                 </a:tc>
-                <a:tc gridSpan="2">
+                <a:tc gridSpan="3">
                   <a:txBody>
                     <a:bodyPr/>
                     <a:lstStyle/>
@@ -3471,51 +3765,20 @@
                     <a:bodyPr/>
                     <a:lstStyle/>
                     <a:p>
-                      <a:endParaRPr lang="en-US" sz="1100" dirty="0" smtClean="0"/>
-                    </a:p>
-                  </a:txBody>
-                  <a:tcPr>
-                    <a:lnL w="12700" cap="flat" cmpd="sng" algn="ctr">
-                      <a:solidFill>
-                        <a:schemeClr val="tx1"/>
-                      </a:solidFill>
-                      <a:prstDash val="solid"/>
-                      <a:round/>
-                      <a:headEnd type="none" w="med" len="med"/>
-                      <a:tailEnd type="none" w="med" len="med"/>
-                    </a:lnL>
-                    <a:lnR w="12700" cap="flat" cmpd="sng" algn="ctr">
-                      <a:solidFill>
-                        <a:schemeClr val="tx1"/>
-                      </a:solidFill>
-                      <a:prstDash val="solid"/>
-                      <a:round/>
-                      <a:headEnd type="none" w="med" len="med"/>
-                      <a:tailEnd type="none" w="med" len="med"/>
-                    </a:lnR>
-                    <a:lnT w="12700" cap="flat" cmpd="sng" algn="ctr">
-                      <a:noFill/>
-                      <a:prstDash val="solid"/>
-                      <a:round/>
-                      <a:headEnd type="none" w="med" len="med"/>
-                      <a:tailEnd type="none" w="med" len="med"/>
-                    </a:lnT>
-                    <a:lnB w="12700" cap="flat" cmpd="sng" algn="ctr">
-                      <a:noFill/>
-                      <a:prstDash val="solid"/>
-                      <a:round/>
-                      <a:headEnd type="none" w="med" len="med"/>
-                      <a:tailEnd type="none" w="med" len="med"/>
-                    </a:lnB>
-                    <a:lnTlToBr w="12700" cmpd="sng">
-                      <a:noFill/>
-                      <a:prstDash val="solid"/>
-                    </a:lnTlToBr>
-                    <a:lnBlToTr w="12700" cmpd="sng">
-                      <a:noFill/>
-                      <a:prstDash val="solid"/>
-                    </a:lnBlToTr>
-                  </a:tcPr>
+                      <a:endParaRPr lang="en-US"/>
+                    </a:p>
+                  </a:txBody>
+                  <a:tcPr/>
+                </a:tc>
+                <a:tc hMerge="1">
+                  <a:txBody>
+                    <a:bodyPr/>
+                    <a:lstStyle/>
+                    <a:p>
+                      <a:endParaRPr lang="en-US"/>
+                    </a:p>
+                  </a:txBody>
+                  <a:tcPr/>
                 </a:tc>
               </a:tr>
               <a:tr h="272454">
@@ -3552,7 +3815,7 @@
                     </a:lnR>
                   </a:tcPr>
                 </a:tc>
-                <a:tc gridSpan="2">
+                <a:tc gridSpan="3">
                   <a:txBody>
                     <a:bodyPr/>
                     <a:lstStyle/>
@@ -3637,51 +3900,20 @@
                     <a:bodyPr/>
                     <a:lstStyle/>
                     <a:p>
-                      <a:endParaRPr lang="en-US" sz="1200" dirty="0"/>
-                    </a:p>
-                  </a:txBody>
-                  <a:tcPr>
-                    <a:lnL w="12700" cap="flat" cmpd="sng" algn="ctr">
-                      <a:solidFill>
-                        <a:schemeClr val="tx1"/>
-                      </a:solidFill>
-                      <a:prstDash val="solid"/>
-                      <a:round/>
-                      <a:headEnd type="none" w="med" len="med"/>
-                      <a:tailEnd type="none" w="med" len="med"/>
-                    </a:lnL>
-                    <a:lnR w="12700" cap="flat" cmpd="sng" algn="ctr">
-                      <a:solidFill>
-                        <a:schemeClr val="tx1"/>
-                      </a:solidFill>
-                      <a:prstDash val="solid"/>
-                      <a:round/>
-                      <a:headEnd type="none" w="med" len="med"/>
-                      <a:tailEnd type="none" w="med" len="med"/>
-                    </a:lnR>
-                    <a:lnT w="12700" cap="flat" cmpd="sng" algn="ctr">
-                      <a:noFill/>
-                      <a:prstDash val="solid"/>
-                      <a:round/>
-                      <a:headEnd type="none" w="med" len="med"/>
-                      <a:tailEnd type="none" w="med" len="med"/>
-                    </a:lnT>
-                    <a:lnB w="12700" cap="flat" cmpd="sng" algn="ctr">
-                      <a:noFill/>
-                      <a:prstDash val="solid"/>
-                      <a:round/>
-                      <a:headEnd type="none" w="med" len="med"/>
-                      <a:tailEnd type="none" w="med" len="med"/>
-                    </a:lnB>
-                    <a:lnTlToBr w="12700" cmpd="sng">
-                      <a:noFill/>
-                      <a:prstDash val="solid"/>
-                    </a:lnTlToBr>
-                    <a:lnBlToTr w="12700" cmpd="sng">
-                      <a:noFill/>
-                      <a:prstDash val="solid"/>
-                    </a:lnBlToTr>
-                  </a:tcPr>
+                      <a:endParaRPr lang="en-US"/>
+                    </a:p>
+                  </a:txBody>
+                  <a:tcPr/>
+                </a:tc>
+                <a:tc hMerge="1">
+                  <a:txBody>
+                    <a:bodyPr/>
+                    <a:lstStyle/>
+                    <a:p>
+                      <a:endParaRPr lang="en-US"/>
+                    </a:p>
+                  </a:txBody>
+                  <a:tcPr/>
                 </a:tc>
               </a:tr>
               <a:tr h="0">
@@ -3769,7 +4001,7 @@
                     </a:lnBlToTr>
                   </a:tcPr>
                 </a:tc>
-                <a:tc>
+                <a:tc gridSpan="2">
                   <a:txBody>
                     <a:bodyPr/>
                     <a:lstStyle/>
@@ -3822,6 +4054,16 @@
                       <a:prstDash val="solid"/>
                     </a:lnBlToTr>
                   </a:tcPr>
+                </a:tc>
+                <a:tc hMerge="1">
+                  <a:txBody>
+                    <a:bodyPr/>
+                    <a:lstStyle/>
+                    <a:p>
+                      <a:endParaRPr lang="en-US"/>
+                    </a:p>
+                  </a:txBody>
+                  <a:tcPr/>
                 </a:tc>
               </a:tr>
               <a:tr h="0">
@@ -3909,12 +4151,12 @@
                     </a:lnBlToTr>
                   </a:tcPr>
                 </a:tc>
-                <a:tc>
-                  <a:txBody>
-                    <a:bodyPr/>
-                    <a:lstStyle/>
-                    <a:p>
-                      <a:endParaRPr lang="en-US" sz="1100" dirty="0" smtClean="0"/>
+                <a:tc gridSpan="2">
+                  <a:txBody>
+                    <a:bodyPr/>
+                    <a:lstStyle/>
+                    <a:p>
+                      <a:endParaRPr lang="en-US" sz="1100" dirty="0"/>
                     </a:p>
                   </a:txBody>
                   <a:tcPr>
@@ -3959,6 +4201,16 @@
                       <a:prstDash val="solid"/>
                     </a:lnBlToTr>
                   </a:tcPr>
+                </a:tc>
+                <a:tc hMerge="1">
+                  <a:txBody>
+                    <a:bodyPr/>
+                    <a:lstStyle/>
+                    <a:p>
+                      <a:endParaRPr lang="en-US"/>
+                    </a:p>
+                  </a:txBody>
+                  <a:tcPr/>
                 </a:tc>
               </a:tr>
               <a:tr h="0">
@@ -4046,7 +4298,7 @@
                     </a:lnBlToTr>
                   </a:tcPr>
                 </a:tc>
-                <a:tc>
+                <a:tc gridSpan="2">
                   <a:txBody>
                     <a:bodyPr/>
                     <a:lstStyle/>
@@ -4061,18 +4313,7 @@
                             </a:schemeClr>
                           </a:solidFill>
                         </a:rPr>
-                        <a:t>Report</a:t>
-                      </a:r>
-                      <a:r>
-                        <a:rPr lang="en-US" sz="1100" b="0" baseline="0" dirty="0" smtClean="0">
-                          <a:solidFill>
-                            <a:schemeClr val="tx1">
-                              <a:lumMod val="95000"/>
-                              <a:lumOff val="5000"/>
-                            </a:schemeClr>
-                          </a:solidFill>
-                        </a:rPr>
-                        <a:t> on Adversary Alpha</a:t>
+                        <a:t>Report on Adversary Alpha's Campaign against the Industrial Control Sector</a:t>
                       </a:r>
                       <a:endParaRPr lang="en-US" sz="1100" b="0" dirty="0" smtClean="0">
                         <a:solidFill>
@@ -4127,6 +4368,16 @@
                     </a:lnBlToTr>
                   </a:tcPr>
                 </a:tc>
+                <a:tc hMerge="1">
+                  <a:txBody>
+                    <a:bodyPr/>
+                    <a:lstStyle/>
+                    <a:p>
+                      <a:endParaRPr lang="en-US"/>
+                    </a:p>
+                  </a:txBody>
+                  <a:tcPr/>
+                </a:tc>
               </a:tr>
               <a:tr h="0">
                 <a:tc>
@@ -4165,7 +4416,11 @@
                     <a:p>
                       <a:r>
                         <a:rPr lang="en-US" sz="1100" b="0" dirty="0" smtClean="0"/>
-                        <a:t>    Handling</a:t>
+                        <a:t>    Package</a:t>
+                      </a:r>
+                      <a:r>
+                        <a:rPr lang="en-US" sz="1100" b="0" baseline="0" dirty="0" smtClean="0"/>
+                        <a:t> Intent</a:t>
                       </a:r>
                       <a:endParaRPr lang="en-US" sz="1100" b="0" dirty="0"/>
                     </a:p>
@@ -4219,6 +4474,17 @@
                     <a:lstStyle/>
                     <a:p>
                       <a:pPr algn="l"/>
+                      <a:r>
+                        <a:rPr lang="en-US" sz="1100" b="0" dirty="0" smtClean="0">
+                          <a:solidFill>
+                            <a:schemeClr val="tx1">
+                              <a:lumMod val="95000"/>
+                              <a:lumOff val="5000"/>
+                            </a:schemeClr>
+                          </a:solidFill>
+                        </a:rPr>
+                        <a:t>Campaign Characterization</a:t>
+                      </a:r>
                       <a:endParaRPr lang="en-US" sz="1100" b="0" dirty="0" smtClean="0">
                         <a:solidFill>
                           <a:schemeClr val="tx1">
@@ -4272,98 +4538,22 @@
                     </a:lnBlToTr>
                   </a:tcPr>
                 </a:tc>
-              </a:tr>
-              <a:tr h="0">
                 <a:tc>
                   <a:txBody>
                     <a:bodyPr/>
                     <a:lstStyle/>
                     <a:p>
-                      <a:endParaRPr lang="en-US" sz="1100" b="0" dirty="0"/>
-                    </a:p>
-                  </a:txBody>
-                  <a:tcPr>
-                    <a:lnL w="12700" cap="flat" cmpd="sng" algn="ctr">
-                      <a:solidFill>
-                        <a:schemeClr val="tx1"/>
-                      </a:solidFill>
-                      <a:prstDash val="solid"/>
-                      <a:round/>
-                      <a:headEnd type="none" w="med" len="med"/>
-                      <a:tailEnd type="none" w="med" len="med"/>
-                    </a:lnL>
-                    <a:lnR w="12700" cap="flat" cmpd="sng" algn="ctr">
-                      <a:solidFill>
-                        <a:schemeClr val="tx1"/>
-                      </a:solidFill>
-                      <a:prstDash val="solid"/>
-                      <a:round/>
-                      <a:headEnd type="none" w="med" len="med"/>
-                      <a:tailEnd type="none" w="med" len="med"/>
-                    </a:lnR>
-                  </a:tcPr>
-                </a:tc>
-                <a:tc>
-                  <a:txBody>
-                    <a:bodyPr/>
-                    <a:lstStyle/>
-                    <a:p>
+                      <a:pPr algn="r"/>
                       <a:r>
-                        <a:rPr lang="en-US" sz="1100" b="0" dirty="0" smtClean="0"/>
-                        <a:t>        Marking</a:t>
+                        <a:rPr lang="en-US" sz="1100" b="0" dirty="0" smtClean="0">
+                          <a:solidFill>
+                            <a:schemeClr val="bg1">
+                              <a:lumMod val="50000"/>
+                            </a:schemeClr>
+                          </a:solidFill>
+                        </a:rPr>
+                        <a:t>PackageIntentVocab-1.0</a:t>
                       </a:r>
-                      <a:endParaRPr lang="en-US" sz="1100" b="0" dirty="0"/>
-                    </a:p>
-                  </a:txBody>
-                  <a:tcPr>
-                    <a:lnL w="12700" cap="flat" cmpd="sng" algn="ctr">
-                      <a:solidFill>
-                        <a:schemeClr val="tx1"/>
-                      </a:solidFill>
-                      <a:prstDash val="solid"/>
-                      <a:round/>
-                      <a:headEnd type="none" w="med" len="med"/>
-                      <a:tailEnd type="none" w="med" len="med"/>
-                    </a:lnL>
-                    <a:lnR w="12700" cap="flat" cmpd="sng" algn="ctr">
-                      <a:solidFill>
-                        <a:schemeClr val="tx1"/>
-                      </a:solidFill>
-                      <a:prstDash val="solid"/>
-                      <a:round/>
-                      <a:headEnd type="none" w="med" len="med"/>
-                      <a:tailEnd type="none" w="med" len="med"/>
-                    </a:lnR>
-                    <a:lnT w="12700" cap="flat" cmpd="sng" algn="ctr">
-                      <a:noFill/>
-                      <a:prstDash val="solid"/>
-                      <a:round/>
-                      <a:headEnd type="none" w="med" len="med"/>
-                      <a:tailEnd type="none" w="med" len="med"/>
-                    </a:lnT>
-                    <a:lnB w="12700" cap="flat" cmpd="sng" algn="ctr">
-                      <a:noFill/>
-                      <a:prstDash val="solid"/>
-                      <a:round/>
-                      <a:headEnd type="none" w="med" len="med"/>
-                      <a:tailEnd type="none" w="med" len="med"/>
-                    </a:lnB>
-                    <a:lnTlToBr w="12700" cmpd="sng">
-                      <a:noFill/>
-                      <a:prstDash val="solid"/>
-                    </a:lnTlToBr>
-                    <a:lnBlToTr w="12700" cmpd="sng">
-                      <a:noFill/>
-                      <a:prstDash val="solid"/>
-                    </a:lnBlToTr>
-                  </a:tcPr>
-                </a:tc>
-                <a:tc>
-                  <a:txBody>
-                    <a:bodyPr/>
-                    <a:lstStyle/>
-                    <a:p>
-                      <a:pPr algn="l"/>
                       <a:endParaRPr lang="en-US" sz="1100" b="0" dirty="0" smtClean="0">
                         <a:solidFill>
                           <a:schemeClr val="tx1">
@@ -4455,6 +4645,300 @@
                     <a:p>
                       <a:r>
                         <a:rPr lang="en-US" sz="1100" b="0" dirty="0" smtClean="0"/>
+                        <a:t>    Handling</a:t>
+                      </a:r>
+                      <a:endParaRPr lang="en-US" sz="1100" b="0" dirty="0"/>
+                    </a:p>
+                  </a:txBody>
+                  <a:tcPr>
+                    <a:lnL w="12700" cap="flat" cmpd="sng" algn="ctr">
+                      <a:solidFill>
+                        <a:schemeClr val="tx1"/>
+                      </a:solidFill>
+                      <a:prstDash val="solid"/>
+                      <a:round/>
+                      <a:headEnd type="none" w="med" len="med"/>
+                      <a:tailEnd type="none" w="med" len="med"/>
+                    </a:lnL>
+                    <a:lnR w="12700" cap="flat" cmpd="sng" algn="ctr">
+                      <a:solidFill>
+                        <a:schemeClr val="tx1"/>
+                      </a:solidFill>
+                      <a:prstDash val="solid"/>
+                      <a:round/>
+                      <a:headEnd type="none" w="med" len="med"/>
+                      <a:tailEnd type="none" w="med" len="med"/>
+                    </a:lnR>
+                    <a:lnT w="12700" cap="flat" cmpd="sng" algn="ctr">
+                      <a:noFill/>
+                      <a:prstDash val="solid"/>
+                      <a:round/>
+                      <a:headEnd type="none" w="med" len="med"/>
+                      <a:tailEnd type="none" w="med" len="med"/>
+                    </a:lnT>
+                    <a:lnB w="12700" cap="flat" cmpd="sng" algn="ctr">
+                      <a:noFill/>
+                      <a:prstDash val="solid"/>
+                      <a:round/>
+                      <a:headEnd type="none" w="med" len="med"/>
+                      <a:tailEnd type="none" w="med" len="med"/>
+                    </a:lnB>
+                    <a:lnTlToBr w="12700" cmpd="sng">
+                      <a:noFill/>
+                      <a:prstDash val="solid"/>
+                    </a:lnTlToBr>
+                    <a:lnBlToTr w="12700" cmpd="sng">
+                      <a:noFill/>
+                      <a:prstDash val="solid"/>
+                    </a:lnBlToTr>
+                  </a:tcPr>
+                </a:tc>
+                <a:tc gridSpan="2">
+                  <a:txBody>
+                    <a:bodyPr/>
+                    <a:lstStyle/>
+                    <a:p>
+                      <a:endParaRPr lang="en-US" sz="1100"/>
+                    </a:p>
+                  </a:txBody>
+                  <a:tcPr>
+                    <a:lnL w="12700" cap="flat" cmpd="sng" algn="ctr">
+                      <a:solidFill>
+                        <a:schemeClr val="tx1"/>
+                      </a:solidFill>
+                      <a:prstDash val="solid"/>
+                      <a:round/>
+                      <a:headEnd type="none" w="med" len="med"/>
+                      <a:tailEnd type="none" w="med" len="med"/>
+                    </a:lnL>
+                    <a:lnR w="12700" cap="flat" cmpd="sng" algn="ctr">
+                      <a:solidFill>
+                        <a:schemeClr val="tx1"/>
+                      </a:solidFill>
+                      <a:prstDash val="solid"/>
+                      <a:round/>
+                      <a:headEnd type="none" w="med" len="med"/>
+                      <a:tailEnd type="none" w="med" len="med"/>
+                    </a:lnR>
+                    <a:lnT w="12700" cap="flat" cmpd="sng" algn="ctr">
+                      <a:noFill/>
+                      <a:prstDash val="solid"/>
+                      <a:round/>
+                      <a:headEnd type="none" w="med" len="med"/>
+                      <a:tailEnd type="none" w="med" len="med"/>
+                    </a:lnT>
+                    <a:lnB w="12700" cap="flat" cmpd="sng" algn="ctr">
+                      <a:noFill/>
+                      <a:prstDash val="solid"/>
+                      <a:round/>
+                      <a:headEnd type="none" w="med" len="med"/>
+                      <a:tailEnd type="none" w="med" len="med"/>
+                    </a:lnB>
+                    <a:lnTlToBr w="12700" cmpd="sng">
+                      <a:noFill/>
+                      <a:prstDash val="solid"/>
+                    </a:lnTlToBr>
+                    <a:lnBlToTr w="12700" cmpd="sng">
+                      <a:noFill/>
+                      <a:prstDash val="solid"/>
+                    </a:lnBlToTr>
+                  </a:tcPr>
+                </a:tc>
+                <a:tc hMerge="1">
+                  <a:txBody>
+                    <a:bodyPr/>
+                    <a:lstStyle/>
+                    <a:p>
+                      <a:endParaRPr lang="en-US"/>
+                    </a:p>
+                  </a:txBody>
+                  <a:tcPr/>
+                </a:tc>
+              </a:tr>
+              <a:tr h="0">
+                <a:tc>
+                  <a:txBody>
+                    <a:bodyPr/>
+                    <a:lstStyle/>
+                    <a:p>
+                      <a:endParaRPr lang="en-US" sz="1100" b="0" dirty="0"/>
+                    </a:p>
+                  </a:txBody>
+                  <a:tcPr>
+                    <a:lnL w="12700" cap="flat" cmpd="sng" algn="ctr">
+                      <a:solidFill>
+                        <a:schemeClr val="tx1"/>
+                      </a:solidFill>
+                      <a:prstDash val="solid"/>
+                      <a:round/>
+                      <a:headEnd type="none" w="med" len="med"/>
+                      <a:tailEnd type="none" w="med" len="med"/>
+                    </a:lnL>
+                    <a:lnR w="12700" cap="flat" cmpd="sng" algn="ctr">
+                      <a:solidFill>
+                        <a:schemeClr val="tx1"/>
+                      </a:solidFill>
+                      <a:prstDash val="solid"/>
+                      <a:round/>
+                      <a:headEnd type="none" w="med" len="med"/>
+                      <a:tailEnd type="none" w="med" len="med"/>
+                    </a:lnR>
+                  </a:tcPr>
+                </a:tc>
+                <a:tc>
+                  <a:txBody>
+                    <a:bodyPr/>
+                    <a:lstStyle/>
+                    <a:p>
+                      <a:r>
+                        <a:rPr lang="en-US" sz="1100" b="0" dirty="0" smtClean="0"/>
+                        <a:t>        Marking</a:t>
+                      </a:r>
+                      <a:endParaRPr lang="en-US" sz="1100" b="0" dirty="0"/>
+                    </a:p>
+                  </a:txBody>
+                  <a:tcPr>
+                    <a:lnL w="12700" cap="flat" cmpd="sng" algn="ctr">
+                      <a:solidFill>
+                        <a:schemeClr val="tx1"/>
+                      </a:solidFill>
+                      <a:prstDash val="solid"/>
+                      <a:round/>
+                      <a:headEnd type="none" w="med" len="med"/>
+                      <a:tailEnd type="none" w="med" len="med"/>
+                    </a:lnL>
+                    <a:lnR w="12700" cap="flat" cmpd="sng" algn="ctr">
+                      <a:solidFill>
+                        <a:schemeClr val="tx1"/>
+                      </a:solidFill>
+                      <a:prstDash val="solid"/>
+                      <a:round/>
+                      <a:headEnd type="none" w="med" len="med"/>
+                      <a:tailEnd type="none" w="med" len="med"/>
+                    </a:lnR>
+                    <a:lnT w="12700" cap="flat" cmpd="sng" algn="ctr">
+                      <a:noFill/>
+                      <a:prstDash val="solid"/>
+                      <a:round/>
+                      <a:headEnd type="none" w="med" len="med"/>
+                      <a:tailEnd type="none" w="med" len="med"/>
+                    </a:lnT>
+                    <a:lnB w="12700" cap="flat" cmpd="sng" algn="ctr">
+                      <a:noFill/>
+                      <a:prstDash val="solid"/>
+                      <a:round/>
+                      <a:headEnd type="none" w="med" len="med"/>
+                      <a:tailEnd type="none" w="med" len="med"/>
+                    </a:lnB>
+                    <a:lnTlToBr w="12700" cmpd="sng">
+                      <a:noFill/>
+                      <a:prstDash val="solid"/>
+                    </a:lnTlToBr>
+                    <a:lnBlToTr w="12700" cmpd="sng">
+                      <a:noFill/>
+                      <a:prstDash val="solid"/>
+                    </a:lnBlToTr>
+                  </a:tcPr>
+                </a:tc>
+                <a:tc gridSpan="2">
+                  <a:txBody>
+                    <a:bodyPr/>
+                    <a:lstStyle/>
+                    <a:p>
+                      <a:endParaRPr lang="en-US" sz="1100" dirty="0"/>
+                    </a:p>
+                  </a:txBody>
+                  <a:tcPr>
+                    <a:lnL w="12700" cap="flat" cmpd="sng" algn="ctr">
+                      <a:solidFill>
+                        <a:schemeClr val="tx1"/>
+                      </a:solidFill>
+                      <a:prstDash val="solid"/>
+                      <a:round/>
+                      <a:headEnd type="none" w="med" len="med"/>
+                      <a:tailEnd type="none" w="med" len="med"/>
+                    </a:lnL>
+                    <a:lnR w="12700" cap="flat" cmpd="sng" algn="ctr">
+                      <a:solidFill>
+                        <a:schemeClr val="tx1"/>
+                      </a:solidFill>
+                      <a:prstDash val="solid"/>
+                      <a:round/>
+                      <a:headEnd type="none" w="med" len="med"/>
+                      <a:tailEnd type="none" w="med" len="med"/>
+                    </a:lnR>
+                    <a:lnT w="12700" cap="flat" cmpd="sng" algn="ctr">
+                      <a:noFill/>
+                      <a:prstDash val="solid"/>
+                      <a:round/>
+                      <a:headEnd type="none" w="med" len="med"/>
+                      <a:tailEnd type="none" w="med" len="med"/>
+                    </a:lnT>
+                    <a:lnB w="12700" cap="flat" cmpd="sng" algn="ctr">
+                      <a:noFill/>
+                      <a:prstDash val="solid"/>
+                      <a:round/>
+                      <a:headEnd type="none" w="med" len="med"/>
+                      <a:tailEnd type="none" w="med" len="med"/>
+                    </a:lnB>
+                    <a:lnTlToBr w="12700" cmpd="sng">
+                      <a:noFill/>
+                      <a:prstDash val="solid"/>
+                    </a:lnTlToBr>
+                    <a:lnBlToTr w="12700" cmpd="sng">
+                      <a:noFill/>
+                      <a:prstDash val="solid"/>
+                    </a:lnBlToTr>
+                  </a:tcPr>
+                </a:tc>
+                <a:tc hMerge="1">
+                  <a:txBody>
+                    <a:bodyPr/>
+                    <a:lstStyle/>
+                    <a:p>
+                      <a:endParaRPr lang="en-US"/>
+                    </a:p>
+                  </a:txBody>
+                  <a:tcPr/>
+                </a:tc>
+              </a:tr>
+              <a:tr h="0">
+                <a:tc>
+                  <a:txBody>
+                    <a:bodyPr/>
+                    <a:lstStyle/>
+                    <a:p>
+                      <a:endParaRPr lang="en-US" sz="1100" b="0" dirty="0"/>
+                    </a:p>
+                  </a:txBody>
+                  <a:tcPr>
+                    <a:lnL w="12700" cap="flat" cmpd="sng" algn="ctr">
+                      <a:solidFill>
+                        <a:schemeClr val="tx1"/>
+                      </a:solidFill>
+                      <a:prstDash val="solid"/>
+                      <a:round/>
+                      <a:headEnd type="none" w="med" len="med"/>
+                      <a:tailEnd type="none" w="med" len="med"/>
+                    </a:lnL>
+                    <a:lnR w="12700" cap="flat" cmpd="sng" algn="ctr">
+                      <a:solidFill>
+                        <a:schemeClr val="tx1"/>
+                      </a:solidFill>
+                      <a:prstDash val="solid"/>
+                      <a:round/>
+                      <a:headEnd type="none" w="med" len="med"/>
+                      <a:tailEnd type="none" w="med" len="med"/>
+                    </a:lnR>
+                  </a:tcPr>
+                </a:tc>
+                <a:tc>
+                  <a:txBody>
+                    <a:bodyPr/>
+                    <a:lstStyle/>
+                    <a:p>
+                      <a:r>
+                        <a:rPr lang="en-US" sz="1100" b="0" dirty="0" smtClean="0"/>
                         <a:t>            Controlled Structure</a:t>
                       </a:r>
                       <a:endParaRPr lang="en-US" sz="1100" b="0" dirty="0"/>
@@ -4503,7 +4987,7 @@
                     </a:lnBlToTr>
                   </a:tcPr>
                 </a:tc>
-                <a:tc>
+                <a:tc gridSpan="2">
                   <a:txBody>
                     <a:bodyPr/>
                     <a:lstStyle/>
@@ -4520,14 +5004,6 @@
                         </a:rPr>
                         <a:t>../../../../node()</a:t>
                       </a:r>
-                      <a:endParaRPr lang="en-US" sz="1100" b="0" dirty="0" smtClean="0">
-                        <a:solidFill>
-                          <a:schemeClr val="tx1">
-                            <a:lumMod val="95000"/>
-                            <a:lumOff val="5000"/>
-                          </a:schemeClr>
-                        </a:solidFill>
-                      </a:endParaRPr>
                     </a:p>
                   </a:txBody>
                   <a:tcPr>
@@ -4572,6 +5048,16 @@
                       <a:prstDash val="solid"/>
                     </a:lnBlToTr>
                   </a:tcPr>
+                </a:tc>
+                <a:tc hMerge="1">
+                  <a:txBody>
+                    <a:bodyPr/>
+                    <a:lstStyle/>
+                    <a:p>
+                      <a:endParaRPr lang="en-US"/>
+                    </a:p>
+                  </a:txBody>
+                  <a:tcPr/>
                 </a:tc>
               </a:tr>
               <a:tr h="0">
@@ -4663,7 +5149,7 @@
                     </a:lnBlToTr>
                   </a:tcPr>
                 </a:tc>
-                <a:tc>
+                <a:tc gridSpan="2">
                   <a:txBody>
                     <a:bodyPr/>
                     <a:lstStyle/>
@@ -4731,6 +5217,16 @@
                     </a:lnBlToTr>
                   </a:tcPr>
                 </a:tc>
+                <a:tc hMerge="1">
+                  <a:txBody>
+                    <a:bodyPr/>
+                    <a:lstStyle/>
+                    <a:p>
+                      <a:endParaRPr lang="en-US"/>
+                    </a:p>
+                  </a:txBody>
+                  <a:tcPr/>
+                </a:tc>
               </a:tr>
               <a:tr h="0">
                 <a:tc>
@@ -4821,7 +5317,7 @@
                     </a:lnBlToTr>
                   </a:tcPr>
                 </a:tc>
-                <a:tc>
+                <a:tc gridSpan="2">
                   <a:txBody>
                     <a:bodyPr/>
                     <a:lstStyle/>
@@ -4838,14 +5334,6 @@
                         </a:rPr>
                         <a:t>AMBER</a:t>
                       </a:r>
-                      <a:endParaRPr lang="en-US" sz="1100" b="0" dirty="0" smtClean="0">
-                        <a:solidFill>
-                          <a:schemeClr val="tx1">
-                            <a:lumMod val="95000"/>
-                            <a:lumOff val="5000"/>
-                          </a:schemeClr>
-                        </a:solidFill>
-                      </a:endParaRPr>
                     </a:p>
                   </a:txBody>
                   <a:tcPr>
@@ -4890,6 +5378,16 @@
                       <a:prstDash val="solid"/>
                     </a:lnBlToTr>
                   </a:tcPr>
+                </a:tc>
+                <a:tc hMerge="1">
+                  <a:txBody>
+                    <a:bodyPr/>
+                    <a:lstStyle/>
+                    <a:p>
+                      <a:endParaRPr lang="en-US"/>
+                    </a:p>
+                  </a:txBody>
+                  <a:tcPr/>
                 </a:tc>
               </a:tr>
               <a:tr h="0">
@@ -4926,7 +5424,7 @@
                     </a:lnR>
                   </a:tcPr>
                 </a:tc>
-                <a:tc gridSpan="2">
+                <a:tc gridSpan="3">
                   <a:txBody>
                     <a:bodyPr/>
                     <a:lstStyle/>
@@ -5011,51 +5509,20 @@
                     <a:bodyPr/>
                     <a:lstStyle/>
                     <a:p>
-                      <a:endParaRPr lang="en-US" sz="1200" dirty="0"/>
-                    </a:p>
-                  </a:txBody>
-                  <a:tcPr>
-                    <a:lnL w="12700" cap="flat" cmpd="sng" algn="ctr">
-                      <a:solidFill>
-                        <a:schemeClr val="tx1"/>
-                      </a:solidFill>
-                      <a:prstDash val="solid"/>
-                      <a:round/>
-                      <a:headEnd type="none" w="med" len="med"/>
-                      <a:tailEnd type="none" w="med" len="med"/>
-                    </a:lnL>
-                    <a:lnR w="12700" cap="flat" cmpd="sng" algn="ctr">
-                      <a:solidFill>
-                        <a:schemeClr val="tx1"/>
-                      </a:solidFill>
-                      <a:prstDash val="solid"/>
-                      <a:round/>
-                      <a:headEnd type="none" w="med" len="med"/>
-                      <a:tailEnd type="none" w="med" len="med"/>
-                    </a:lnR>
-                    <a:lnT w="12700" cap="flat" cmpd="sng" algn="ctr">
-                      <a:noFill/>
-                      <a:prstDash val="solid"/>
-                      <a:round/>
-                      <a:headEnd type="none" w="med" len="med"/>
-                      <a:tailEnd type="none" w="med" len="med"/>
-                    </a:lnT>
-                    <a:lnB w="12700" cap="flat" cmpd="sng" algn="ctr">
-                      <a:noFill/>
-                      <a:prstDash val="solid"/>
-                      <a:round/>
-                      <a:headEnd type="none" w="med" len="med"/>
-                      <a:tailEnd type="none" w="med" len="med"/>
-                    </a:lnB>
-                    <a:lnTlToBr w="12700" cmpd="sng">
-                      <a:noFill/>
-                      <a:prstDash val="solid"/>
-                    </a:lnTlToBr>
-                    <a:lnBlToTr w="12700" cmpd="sng">
-                      <a:noFill/>
-                      <a:prstDash val="solid"/>
-                    </a:lnBlToTr>
-                  </a:tcPr>
+                      <a:endParaRPr lang="en-US"/>
+                    </a:p>
+                  </a:txBody>
+                  <a:tcPr/>
+                </a:tc>
+                <a:tc hMerge="1">
+                  <a:txBody>
+                    <a:bodyPr/>
+                    <a:lstStyle/>
+                    <a:p>
+                      <a:endParaRPr lang="en-US"/>
+                    </a:p>
+                  </a:txBody>
+                  <a:tcPr/>
                 </a:tc>
               </a:tr>
               <a:tr h="0">
@@ -5143,7 +5610,7 @@
                     </a:lnBlToTr>
                   </a:tcPr>
                 </a:tc>
-                <a:tc>
+                <a:tc gridSpan="2">
                   <a:txBody>
                     <a:bodyPr/>
                     <a:lstStyle/>
@@ -5196,6 +5663,16 @@
                       <a:prstDash val="solid"/>
                     </a:lnBlToTr>
                   </a:tcPr>
+                </a:tc>
+                <a:tc hMerge="1">
+                  <a:txBody>
+                    <a:bodyPr/>
+                    <a:lstStyle/>
+                    <a:p>
+                      <a:endParaRPr lang="en-US"/>
+                    </a:p>
+                  </a:txBody>
+                  <a:tcPr/>
                 </a:tc>
               </a:tr>
               <a:tr h="0">
@@ -5283,12 +5760,12 @@
                     </a:lnBlToTr>
                   </a:tcPr>
                 </a:tc>
-                <a:tc>
-                  <a:txBody>
-                    <a:bodyPr/>
-                    <a:lstStyle/>
-                    <a:p>
-                      <a:endParaRPr lang="en-US" sz="1100" dirty="0" smtClean="0"/>
+                <a:tc gridSpan="2">
+                  <a:txBody>
+                    <a:bodyPr/>
+                    <a:lstStyle/>
+                    <a:p>
+                      <a:endParaRPr lang="en-US" sz="1100" dirty="0"/>
                     </a:p>
                   </a:txBody>
                   <a:tcPr>
@@ -5333,6 +5810,16 @@
                       <a:prstDash val="solid"/>
                     </a:lnBlToTr>
                   </a:tcPr>
+                </a:tc>
+                <a:tc hMerge="1">
+                  <a:txBody>
+                    <a:bodyPr/>
+                    <a:lstStyle/>
+                    <a:p>
+                      <a:endParaRPr lang="en-US"/>
+                    </a:p>
+                  </a:txBody>
+                  <a:tcPr/>
                 </a:tc>
               </a:tr>
               <a:tr h="0">
@@ -5420,7 +5907,7 @@
                     </a:lnBlToTr>
                   </a:tcPr>
                 </a:tc>
-                <a:tc>
+                <a:tc gridSpan="2">
                   <a:txBody>
                     <a:bodyPr/>
                     <a:lstStyle/>
@@ -5435,10 +5922,10 @@
                             </a:schemeClr>
                           </a:solidFill>
                         </a:rPr>
-                        <a:t>Report</a:t>
+                        <a:t>Indicators for Malware </a:t>
                       </a:r>
                       <a:r>
-                        <a:rPr lang="en-US" sz="1100" b="0" baseline="0" dirty="0" smtClean="0">
+                        <a:rPr lang="en-US" sz="1100" b="0" dirty="0" err="1" smtClean="0">
                           <a:solidFill>
                             <a:schemeClr val="tx1">
                               <a:lumMod val="95000"/>
@@ -5446,7 +5933,7 @@
                             </a:schemeClr>
                           </a:solidFill>
                         </a:rPr>
-                        <a:t> on Adversary Bravo</a:t>
+                        <a:t>DrownedRat</a:t>
                       </a:r>
                       <a:endParaRPr lang="en-US" sz="1100" b="0" dirty="0" smtClean="0">
                         <a:solidFill>
@@ -5501,6 +5988,16 @@
                     </a:lnBlToTr>
                   </a:tcPr>
                 </a:tc>
+                <a:tc hMerge="1">
+                  <a:txBody>
+                    <a:bodyPr/>
+                    <a:lstStyle/>
+                    <a:p>
+                      <a:endParaRPr lang="en-US"/>
+                    </a:p>
+                  </a:txBody>
+                  <a:tcPr/>
+                </a:tc>
               </a:tr>
               <a:tr h="0">
                 <a:tc>
@@ -5539,7 +6036,11 @@
                     <a:p>
                       <a:r>
                         <a:rPr lang="en-US" sz="1100" b="0" dirty="0" smtClean="0"/>
-                        <a:t>    Handling</a:t>
+                        <a:t>    Package</a:t>
+                      </a:r>
+                      <a:r>
+                        <a:rPr lang="en-US" sz="1100" b="0" baseline="0" dirty="0" smtClean="0"/>
+                        <a:t> Intent</a:t>
                       </a:r>
                       <a:endParaRPr lang="en-US" sz="1100" b="0" dirty="0"/>
                     </a:p>
@@ -5593,6 +6094,17 @@
                     <a:lstStyle/>
                     <a:p>
                       <a:pPr algn="l"/>
+                      <a:r>
+                        <a:rPr lang="en-US" sz="1100" b="0" dirty="0" smtClean="0">
+                          <a:solidFill>
+                            <a:schemeClr val="tx1">
+                              <a:lumMod val="95000"/>
+                              <a:lumOff val="5000"/>
+                            </a:schemeClr>
+                          </a:solidFill>
+                        </a:rPr>
+                        <a:t>Indicators – Malware Artifacts</a:t>
+                      </a:r>
                       <a:endParaRPr lang="en-US" sz="1100" b="0" dirty="0" smtClean="0">
                         <a:solidFill>
                           <a:schemeClr val="tx1">
@@ -5646,98 +6158,22 @@
                     </a:lnBlToTr>
                   </a:tcPr>
                 </a:tc>
-              </a:tr>
-              <a:tr h="0">
                 <a:tc>
                   <a:txBody>
                     <a:bodyPr/>
                     <a:lstStyle/>
                     <a:p>
-                      <a:endParaRPr lang="en-US" sz="1100" b="0" dirty="0"/>
-                    </a:p>
-                  </a:txBody>
-                  <a:tcPr>
-                    <a:lnL w="12700" cap="flat" cmpd="sng" algn="ctr">
-                      <a:solidFill>
-                        <a:schemeClr val="tx1"/>
-                      </a:solidFill>
-                      <a:prstDash val="solid"/>
-                      <a:round/>
-                      <a:headEnd type="none" w="med" len="med"/>
-                      <a:tailEnd type="none" w="med" len="med"/>
-                    </a:lnL>
-                    <a:lnR w="12700" cap="flat" cmpd="sng" algn="ctr">
-                      <a:solidFill>
-                        <a:schemeClr val="tx1"/>
-                      </a:solidFill>
-                      <a:prstDash val="solid"/>
-                      <a:round/>
-                      <a:headEnd type="none" w="med" len="med"/>
-                      <a:tailEnd type="none" w="med" len="med"/>
-                    </a:lnR>
-                  </a:tcPr>
-                </a:tc>
-                <a:tc>
-                  <a:txBody>
-                    <a:bodyPr/>
-                    <a:lstStyle/>
-                    <a:p>
+                      <a:pPr algn="r"/>
                       <a:r>
-                        <a:rPr lang="en-US" sz="1100" b="0" dirty="0" smtClean="0"/>
-                        <a:t>        Marking</a:t>
+                        <a:rPr lang="en-US" sz="1100" b="0" dirty="0" smtClean="0">
+                          <a:solidFill>
+                            <a:schemeClr val="bg1">
+                              <a:lumMod val="50000"/>
+                            </a:schemeClr>
+                          </a:solidFill>
+                        </a:rPr>
+                        <a:t>PackageIntentVocab-1.0</a:t>
                       </a:r>
-                      <a:endParaRPr lang="en-US" sz="1100" b="0" dirty="0"/>
-                    </a:p>
-                  </a:txBody>
-                  <a:tcPr>
-                    <a:lnL w="12700" cap="flat" cmpd="sng" algn="ctr">
-                      <a:solidFill>
-                        <a:schemeClr val="tx1"/>
-                      </a:solidFill>
-                      <a:prstDash val="solid"/>
-                      <a:round/>
-                      <a:headEnd type="none" w="med" len="med"/>
-                      <a:tailEnd type="none" w="med" len="med"/>
-                    </a:lnL>
-                    <a:lnR w="12700" cap="flat" cmpd="sng" algn="ctr">
-                      <a:solidFill>
-                        <a:schemeClr val="tx1"/>
-                      </a:solidFill>
-                      <a:prstDash val="solid"/>
-                      <a:round/>
-                      <a:headEnd type="none" w="med" len="med"/>
-                      <a:tailEnd type="none" w="med" len="med"/>
-                    </a:lnR>
-                    <a:lnT w="12700" cap="flat" cmpd="sng" algn="ctr">
-                      <a:noFill/>
-                      <a:prstDash val="solid"/>
-                      <a:round/>
-                      <a:headEnd type="none" w="med" len="med"/>
-                      <a:tailEnd type="none" w="med" len="med"/>
-                    </a:lnT>
-                    <a:lnB w="12700" cap="flat" cmpd="sng" algn="ctr">
-                      <a:noFill/>
-                      <a:prstDash val="solid"/>
-                      <a:round/>
-                      <a:headEnd type="none" w="med" len="med"/>
-                      <a:tailEnd type="none" w="med" len="med"/>
-                    </a:lnB>
-                    <a:lnTlToBr w="12700" cmpd="sng">
-                      <a:noFill/>
-                      <a:prstDash val="solid"/>
-                    </a:lnTlToBr>
-                    <a:lnBlToTr w="12700" cmpd="sng">
-                      <a:noFill/>
-                      <a:prstDash val="solid"/>
-                    </a:lnBlToTr>
-                  </a:tcPr>
-                </a:tc>
-                <a:tc>
-                  <a:txBody>
-                    <a:bodyPr/>
-                    <a:lstStyle/>
-                    <a:p>
-                      <a:pPr algn="l"/>
                       <a:endParaRPr lang="en-US" sz="1100" b="0" dirty="0" smtClean="0">
                         <a:solidFill>
                           <a:schemeClr val="tx1">
@@ -5748,6 +6184,18 @@
                       </a:endParaRPr>
                     </a:p>
                   </a:txBody>
+                  <a:tcPr/>
+                </a:tc>
+              </a:tr>
+              <a:tr h="0">
+                <a:tc>
+                  <a:txBody>
+                    <a:bodyPr/>
+                    <a:lstStyle/>
+                    <a:p>
+                      <a:endParaRPr lang="en-US" sz="1100" b="0" dirty="0"/>
+                    </a:p>
+                  </a:txBody>
                   <a:tcPr>
                     <a:lnL w="12700" cap="flat" cmpd="sng" algn="ctr">
                       <a:solidFill>
@@ -5767,6 +6215,39 @@
                       <a:headEnd type="none" w="med" len="med"/>
                       <a:tailEnd type="none" w="med" len="med"/>
                     </a:lnR>
+                  </a:tcPr>
+                </a:tc>
+                <a:tc>
+                  <a:txBody>
+                    <a:bodyPr/>
+                    <a:lstStyle/>
+                    <a:p>
+                      <a:r>
+                        <a:rPr lang="en-US" sz="1100" b="0" dirty="0" smtClean="0"/>
+                        <a:t>    Handling</a:t>
+                      </a:r>
+                      <a:endParaRPr lang="en-US" sz="1100" b="0" dirty="0"/>
+                    </a:p>
+                  </a:txBody>
+                  <a:tcPr>
+                    <a:lnL w="12700" cap="flat" cmpd="sng" algn="ctr">
+                      <a:solidFill>
+                        <a:schemeClr val="tx1"/>
+                      </a:solidFill>
+                      <a:prstDash val="solid"/>
+                      <a:round/>
+                      <a:headEnd type="none" w="med" len="med"/>
+                      <a:tailEnd type="none" w="med" len="med"/>
+                    </a:lnL>
+                    <a:lnR w="12700" cap="flat" cmpd="sng" algn="ctr">
+                      <a:solidFill>
+                        <a:schemeClr val="tx1"/>
+                      </a:solidFill>
+                      <a:prstDash val="solid"/>
+                      <a:round/>
+                      <a:headEnd type="none" w="med" len="med"/>
+                      <a:tailEnd type="none" w="med" len="med"/>
+                    </a:lnR>
                     <a:lnT w="12700" cap="flat" cmpd="sng" algn="ctr">
                       <a:noFill/>
                       <a:prstDash val="solid"/>
@@ -5790,6 +6271,214 @@
                       <a:prstDash val="solid"/>
                     </a:lnBlToTr>
                   </a:tcPr>
+                </a:tc>
+                <a:tc gridSpan="2">
+                  <a:txBody>
+                    <a:bodyPr/>
+                    <a:lstStyle/>
+                    <a:p>
+                      <a:endParaRPr lang="en-US" sz="1100" dirty="0"/>
+                    </a:p>
+                  </a:txBody>
+                  <a:tcPr>
+                    <a:lnL w="12700" cap="flat" cmpd="sng" algn="ctr">
+                      <a:solidFill>
+                        <a:schemeClr val="tx1"/>
+                      </a:solidFill>
+                      <a:prstDash val="solid"/>
+                      <a:round/>
+                      <a:headEnd type="none" w="med" len="med"/>
+                      <a:tailEnd type="none" w="med" len="med"/>
+                    </a:lnL>
+                    <a:lnR w="12700" cap="flat" cmpd="sng" algn="ctr">
+                      <a:solidFill>
+                        <a:schemeClr val="tx1"/>
+                      </a:solidFill>
+                      <a:prstDash val="solid"/>
+                      <a:round/>
+                      <a:headEnd type="none" w="med" len="med"/>
+                      <a:tailEnd type="none" w="med" len="med"/>
+                    </a:lnR>
+                    <a:lnT w="12700" cap="flat" cmpd="sng" algn="ctr">
+                      <a:noFill/>
+                      <a:prstDash val="solid"/>
+                      <a:round/>
+                      <a:headEnd type="none" w="med" len="med"/>
+                      <a:tailEnd type="none" w="med" len="med"/>
+                    </a:lnT>
+                    <a:lnB w="12700" cap="flat" cmpd="sng" algn="ctr">
+                      <a:noFill/>
+                      <a:prstDash val="solid"/>
+                      <a:round/>
+                      <a:headEnd type="none" w="med" len="med"/>
+                      <a:tailEnd type="none" w="med" len="med"/>
+                    </a:lnB>
+                    <a:lnTlToBr w="12700" cmpd="sng">
+                      <a:noFill/>
+                      <a:prstDash val="solid"/>
+                    </a:lnTlToBr>
+                    <a:lnBlToTr w="12700" cmpd="sng">
+                      <a:noFill/>
+                      <a:prstDash val="solid"/>
+                    </a:lnBlToTr>
+                  </a:tcPr>
+                </a:tc>
+                <a:tc hMerge="1">
+                  <a:txBody>
+                    <a:bodyPr/>
+                    <a:lstStyle/>
+                    <a:p>
+                      <a:endParaRPr lang="en-US"/>
+                    </a:p>
+                  </a:txBody>
+                  <a:tcPr/>
+                </a:tc>
+              </a:tr>
+              <a:tr h="0">
+                <a:tc>
+                  <a:txBody>
+                    <a:bodyPr/>
+                    <a:lstStyle/>
+                    <a:p>
+                      <a:endParaRPr lang="en-US" sz="1100" b="0" dirty="0"/>
+                    </a:p>
+                  </a:txBody>
+                  <a:tcPr>
+                    <a:lnL w="12700" cap="flat" cmpd="sng" algn="ctr">
+                      <a:solidFill>
+                        <a:schemeClr val="tx1"/>
+                      </a:solidFill>
+                      <a:prstDash val="solid"/>
+                      <a:round/>
+                      <a:headEnd type="none" w="med" len="med"/>
+                      <a:tailEnd type="none" w="med" len="med"/>
+                    </a:lnL>
+                    <a:lnR w="12700" cap="flat" cmpd="sng" algn="ctr">
+                      <a:solidFill>
+                        <a:schemeClr val="tx1"/>
+                      </a:solidFill>
+                      <a:prstDash val="solid"/>
+                      <a:round/>
+                      <a:headEnd type="none" w="med" len="med"/>
+                      <a:tailEnd type="none" w="med" len="med"/>
+                    </a:lnR>
+                  </a:tcPr>
+                </a:tc>
+                <a:tc>
+                  <a:txBody>
+                    <a:bodyPr/>
+                    <a:lstStyle/>
+                    <a:p>
+                      <a:r>
+                        <a:rPr lang="en-US" sz="1100" b="0" dirty="0" smtClean="0"/>
+                        <a:t>        Marking</a:t>
+                      </a:r>
+                      <a:endParaRPr lang="en-US" sz="1100" b="0" dirty="0"/>
+                    </a:p>
+                  </a:txBody>
+                  <a:tcPr>
+                    <a:lnL w="12700" cap="flat" cmpd="sng" algn="ctr">
+                      <a:solidFill>
+                        <a:schemeClr val="tx1"/>
+                      </a:solidFill>
+                      <a:prstDash val="solid"/>
+                      <a:round/>
+                      <a:headEnd type="none" w="med" len="med"/>
+                      <a:tailEnd type="none" w="med" len="med"/>
+                    </a:lnL>
+                    <a:lnR w="12700" cap="flat" cmpd="sng" algn="ctr">
+                      <a:solidFill>
+                        <a:schemeClr val="tx1"/>
+                      </a:solidFill>
+                      <a:prstDash val="solid"/>
+                      <a:round/>
+                      <a:headEnd type="none" w="med" len="med"/>
+                      <a:tailEnd type="none" w="med" len="med"/>
+                    </a:lnR>
+                    <a:lnT w="12700" cap="flat" cmpd="sng" algn="ctr">
+                      <a:noFill/>
+                      <a:prstDash val="solid"/>
+                      <a:round/>
+                      <a:headEnd type="none" w="med" len="med"/>
+                      <a:tailEnd type="none" w="med" len="med"/>
+                    </a:lnT>
+                    <a:lnB w="12700" cap="flat" cmpd="sng" algn="ctr">
+                      <a:noFill/>
+                      <a:prstDash val="solid"/>
+                      <a:round/>
+                      <a:headEnd type="none" w="med" len="med"/>
+                      <a:tailEnd type="none" w="med" len="med"/>
+                    </a:lnB>
+                    <a:lnTlToBr w="12700" cmpd="sng">
+                      <a:noFill/>
+                      <a:prstDash val="solid"/>
+                    </a:lnTlToBr>
+                    <a:lnBlToTr w="12700" cmpd="sng">
+                      <a:noFill/>
+                      <a:prstDash val="solid"/>
+                    </a:lnBlToTr>
+                  </a:tcPr>
+                </a:tc>
+                <a:tc gridSpan="2">
+                  <a:txBody>
+                    <a:bodyPr/>
+                    <a:lstStyle/>
+                    <a:p>
+                      <a:endParaRPr lang="en-US" sz="1100" dirty="0"/>
+                    </a:p>
+                  </a:txBody>
+                  <a:tcPr>
+                    <a:lnL w="12700" cap="flat" cmpd="sng" algn="ctr">
+                      <a:solidFill>
+                        <a:schemeClr val="tx1"/>
+                      </a:solidFill>
+                      <a:prstDash val="solid"/>
+                      <a:round/>
+                      <a:headEnd type="none" w="med" len="med"/>
+                      <a:tailEnd type="none" w="med" len="med"/>
+                    </a:lnL>
+                    <a:lnR w="12700" cap="flat" cmpd="sng" algn="ctr">
+                      <a:solidFill>
+                        <a:schemeClr val="tx1"/>
+                      </a:solidFill>
+                      <a:prstDash val="solid"/>
+                      <a:round/>
+                      <a:headEnd type="none" w="med" len="med"/>
+                      <a:tailEnd type="none" w="med" len="med"/>
+                    </a:lnR>
+                    <a:lnT w="12700" cap="flat" cmpd="sng" algn="ctr">
+                      <a:noFill/>
+                      <a:prstDash val="solid"/>
+                      <a:round/>
+                      <a:headEnd type="none" w="med" len="med"/>
+                      <a:tailEnd type="none" w="med" len="med"/>
+                    </a:lnT>
+                    <a:lnB w="12700" cap="flat" cmpd="sng" algn="ctr">
+                      <a:noFill/>
+                      <a:prstDash val="solid"/>
+                      <a:round/>
+                      <a:headEnd type="none" w="med" len="med"/>
+                      <a:tailEnd type="none" w="med" len="med"/>
+                    </a:lnB>
+                    <a:lnTlToBr w="12700" cmpd="sng">
+                      <a:noFill/>
+                      <a:prstDash val="solid"/>
+                    </a:lnTlToBr>
+                    <a:lnBlToTr w="12700" cmpd="sng">
+                      <a:noFill/>
+                      <a:prstDash val="solid"/>
+                    </a:lnBlToTr>
+                  </a:tcPr>
+                </a:tc>
+                <a:tc hMerge="1">
+                  <a:txBody>
+                    <a:bodyPr/>
+                    <a:lstStyle/>
+                    <a:p>
+                      <a:endParaRPr lang="en-US"/>
+                    </a:p>
+                  </a:txBody>
+                  <a:tcPr/>
                 </a:tc>
               </a:tr>
               <a:tr h="0">
@@ -5877,7 +6566,7 @@
                     </a:lnBlToTr>
                   </a:tcPr>
                 </a:tc>
-                <a:tc>
+                <a:tc gridSpan="2">
                   <a:txBody>
                     <a:bodyPr/>
                     <a:lstStyle/>
@@ -5939,6 +6628,16 @@
                     </a:lnBlToTr>
                   </a:tcPr>
                 </a:tc>
+                <a:tc hMerge="1">
+                  <a:txBody>
+                    <a:bodyPr/>
+                    <a:lstStyle/>
+                    <a:p>
+                      <a:endParaRPr lang="en-US"/>
+                    </a:p>
+                  </a:txBody>
+                  <a:tcPr/>
+                </a:tc>
               </a:tr>
               <a:tr h="0">
                 <a:tc>
@@ -6029,7 +6728,7 @@
                     </a:lnBlToTr>
                   </a:tcPr>
                 </a:tc>
-                <a:tc>
+                <a:tc gridSpan="2">
                   <a:txBody>
                     <a:bodyPr/>
                     <a:lstStyle/>
@@ -6097,6 +6796,16 @@
                     </a:lnBlToTr>
                   </a:tcPr>
                 </a:tc>
+                <a:tc hMerge="1">
+                  <a:txBody>
+                    <a:bodyPr/>
+                    <a:lstStyle/>
+                    <a:p>
+                      <a:endParaRPr lang="en-US"/>
+                    </a:p>
+                  </a:txBody>
+                  <a:tcPr/>
+                </a:tc>
               </a:tr>
               <a:tr h="0">
                 <a:tc>
@@ -6198,7 +6907,7 @@
                     </a:lnBlToTr>
                   </a:tcPr>
                 </a:tc>
-                <a:tc>
+                <a:tc gridSpan="2">
                   <a:txBody>
                     <a:bodyPr/>
                     <a:lstStyle/>
@@ -6215,14 +6924,6 @@
                         </a:rPr>
                         <a:t>RED</a:t>
                       </a:r>
-                      <a:endParaRPr lang="en-US" sz="1100" b="0" dirty="0" smtClean="0">
-                        <a:solidFill>
-                          <a:schemeClr val="tx1">
-                            <a:lumMod val="95000"/>
-                            <a:lumOff val="5000"/>
-                          </a:schemeClr>
-                        </a:solidFill>
-                      </a:endParaRPr>
                     </a:p>
                   </a:txBody>
                   <a:tcPr>
@@ -6269,6 +6970,16 @@
                       <a:prstDash val="solid"/>
                     </a:lnBlToTr>
                   </a:tcPr>
+                </a:tc>
+                <a:tc hMerge="1">
+                  <a:txBody>
+                    <a:bodyPr/>
+                    <a:lstStyle/>
+                    <a:p>
+                      <a:endParaRPr lang="en-US"/>
+                    </a:p>
+                  </a:txBody>
+                  <a:tcPr/>
                 </a:tc>
               </a:tr>
             </a:tbl>

</xml_diff>

<commit_message>
Fix to the Python campaign victim targeting code
</commit_message>
<xml_diff>
--- a/idioms/packages-and-reports/wrapper/diagram.pptx
+++ b/idioms/packages-and-reports/wrapper/diagram.pptx
@@ -3104,14 +3104,14 @@
           <p:nvPr>
             <p:extLst>
               <p:ext uri="{D42A27DB-BD31-4B8C-83A1-F6EECF244321}">
-                <p14:modId xmlns:p14="http://schemas.microsoft.com/office/powerpoint/2010/main" val="1760519386"/>
+                <p14:modId xmlns:p14="http://schemas.microsoft.com/office/powerpoint/2010/main" val="307297966"/>
               </p:ext>
             </p:extLst>
           </p:nvPr>
         </p:nvGraphicFramePr>
         <p:xfrm>
           <a:off x="431256" y="140931"/>
-          <a:ext cx="7769769" cy="6964680"/>
+          <a:ext cx="7769769" cy="7223760"/>
         </p:xfrm>
         <a:graphic>
           <a:graphicData uri="http://schemas.openxmlformats.org/drawingml/2006/table">
@@ -3456,6 +3456,117 @@
                     <a:p>
                       <a:r>
                         <a:rPr lang="en-US" sz="1100" b="0" dirty="0" smtClean="0"/>
+                        <a:t>    Information Source</a:t>
+                      </a:r>
+                      <a:endParaRPr lang="en-US" sz="1100" b="0" dirty="0"/>
+                    </a:p>
+                  </a:txBody>
+                  <a:tcPr>
+                    <a:lnL w="12700" cap="flat" cmpd="sng" algn="ctr">
+                      <a:solidFill>
+                        <a:schemeClr val="tx1"/>
+                      </a:solidFill>
+                      <a:prstDash val="solid"/>
+                      <a:round/>
+                      <a:headEnd type="none" w="med" len="med"/>
+                      <a:tailEnd type="none" w="med" len="med"/>
+                    </a:lnL>
+                    <a:lnR w="12700" cap="flat" cmpd="sng" algn="ctr">
+                      <a:solidFill>
+                        <a:schemeClr val="tx1"/>
+                      </a:solidFill>
+                      <a:prstDash val="solid"/>
+                      <a:round/>
+                      <a:headEnd type="none" w="med" len="med"/>
+                      <a:tailEnd type="none" w="med" len="med"/>
+                    </a:lnR>
+                  </a:tcPr>
+                </a:tc>
+                <a:tc gridSpan="3">
+                  <a:txBody>
+                    <a:bodyPr/>
+                    <a:lstStyle/>
+                    <a:p>
+                      <a:pPr algn="r"/>
+                      <a:endParaRPr lang="en-US" sz="1100" dirty="0" smtClean="0"/>
+                    </a:p>
+                  </a:txBody>
+                  <a:tcPr>
+                    <a:lnL w="12700" cap="flat" cmpd="sng" algn="ctr">
+                      <a:solidFill>
+                        <a:schemeClr val="tx1"/>
+                      </a:solidFill>
+                      <a:prstDash val="solid"/>
+                      <a:round/>
+                      <a:headEnd type="none" w="med" len="med"/>
+                      <a:tailEnd type="none" w="med" len="med"/>
+                    </a:lnL>
+                    <a:lnR w="12700" cap="flat" cmpd="sng" algn="ctr">
+                      <a:solidFill>
+                        <a:schemeClr val="tx1"/>
+                      </a:solidFill>
+                      <a:prstDash val="solid"/>
+                      <a:round/>
+                      <a:headEnd type="none" w="med" len="med"/>
+                      <a:tailEnd type="none" w="med" len="med"/>
+                    </a:lnR>
+                    <a:lnT w="12700" cap="flat" cmpd="sng" algn="ctr">
+                      <a:noFill/>
+                      <a:prstDash val="solid"/>
+                      <a:round/>
+                      <a:headEnd type="none" w="med" len="med"/>
+                      <a:tailEnd type="none" w="med" len="med"/>
+                    </a:lnT>
+                    <a:lnB w="12700" cap="flat" cmpd="sng" algn="ctr">
+                      <a:noFill/>
+                      <a:prstDash val="solid"/>
+                      <a:round/>
+                      <a:headEnd type="none" w="med" len="med"/>
+                      <a:tailEnd type="none" w="med" len="med"/>
+                    </a:lnB>
+                    <a:lnTlToBr w="12700" cmpd="sng">
+                      <a:noFill/>
+                      <a:prstDash val="solid"/>
+                    </a:lnTlToBr>
+                    <a:lnBlToTr w="12700" cmpd="sng">
+                      <a:noFill/>
+                      <a:prstDash val="solid"/>
+                    </a:lnBlToTr>
+                  </a:tcPr>
+                </a:tc>
+                <a:tc hMerge="1">
+                  <a:txBody>
+                    <a:bodyPr/>
+                    <a:lstStyle/>
+                    <a:p>
+                      <a:endParaRPr lang="en-US"/>
+                    </a:p>
+                  </a:txBody>
+                  <a:tcPr/>
+                </a:tc>
+                <a:tc hMerge="1">
+                  <a:txBody>
+                    <a:bodyPr/>
+                    <a:lstStyle/>
+                    <a:p>
+                      <a:endParaRPr lang="en-US"/>
+                    </a:p>
+                  </a:txBody>
+                  <a:tcPr/>
+                </a:tc>
+              </a:tr>
+              <a:tr h="0">
+                <a:tc>
+                  <a:txBody>
+                    <a:bodyPr/>
+                    <a:lstStyle/>
+                    <a:p>
+                      <a:r>
+                        <a:rPr lang="en-US" sz="1100" b="0" dirty="0" smtClean="0"/>
+                        <a:t>    </a:t>
+                      </a:r>
+                      <a:r>
+                        <a:rPr lang="en-US" sz="1100" b="0" dirty="0" smtClean="0"/>
                         <a:t>    Identity</a:t>
                       </a:r>
                       <a:endParaRPr lang="en-US" sz="1100" b="0" dirty="0"/>
@@ -3573,7 +3684,11 @@
                     <a:p>
                       <a:r>
                         <a:rPr lang="en-US" sz="1100" b="0" dirty="0" smtClean="0"/>
-                        <a:t>        Name</a:t>
+                        <a:t>        </a:t>
+                      </a:r>
+                      <a:r>
+                        <a:rPr lang="en-US" sz="1100" b="0" dirty="0" smtClean="0"/>
+                        <a:t>    Name</a:t>
                       </a:r>
                       <a:endParaRPr lang="en-US" sz="1100" b="0" dirty="0"/>
                     </a:p>
@@ -3608,7 +3723,6 @@
                         <a:rPr lang="en-US" sz="1100" dirty="0" smtClean="0"/>
                         <a:t>Government Sharing Program - GSP</a:t>
                       </a:r>
-                      <a:endParaRPr lang="en-US" sz="1100" dirty="0" smtClean="0"/>
                     </a:p>
                   </a:txBody>
                   <a:tcPr>
@@ -4315,14 +4429,6 @@
                         </a:rPr>
                         <a:t>Report on Adversary Alpha's Campaign against the Industrial Control Sector</a:t>
                       </a:r>
-                      <a:endParaRPr lang="en-US" sz="1100" b="0" dirty="0" smtClean="0">
-                        <a:solidFill>
-                          <a:schemeClr val="tx1">
-                            <a:lumMod val="95000"/>
-                            <a:lumOff val="5000"/>
-                          </a:schemeClr>
-                        </a:solidFill>
-                      </a:endParaRPr>
                     </a:p>
                   </a:txBody>
                   <a:tcPr>
@@ -4485,14 +4591,6 @@
                         </a:rPr>
                         <a:t>Campaign Characterization</a:t>
                       </a:r>
-                      <a:endParaRPr lang="en-US" sz="1100" b="0" dirty="0" smtClean="0">
-                        <a:solidFill>
-                          <a:schemeClr val="tx1">
-                            <a:lumMod val="95000"/>
-                            <a:lumOff val="5000"/>
-                          </a:schemeClr>
-                        </a:solidFill>
-                      </a:endParaRPr>
                     </a:p>
                   </a:txBody>
                   <a:tcPr>
@@ -4506,9 +4604,7 @@
                       <a:tailEnd type="none" w="med" len="med"/>
                     </a:lnL>
                     <a:lnR w="12700" cap="flat" cmpd="sng" algn="ctr">
-                      <a:solidFill>
-                        <a:schemeClr val="tx1"/>
-                      </a:solidFill>
+                      <a:noFill/>
                       <a:prstDash val="solid"/>
                       <a:round/>
                       <a:headEnd type="none" w="med" len="med"/>
@@ -4566,9 +4662,7 @@
                   </a:txBody>
                   <a:tcPr>
                     <a:lnL w="12700" cap="flat" cmpd="sng" algn="ctr">
-                      <a:solidFill>
-                        <a:schemeClr val="tx1"/>
-                      </a:solidFill>
+                      <a:noFill/>
                       <a:prstDash val="solid"/>
                       <a:round/>
                       <a:headEnd type="none" w="med" len="med"/>
@@ -6105,14 +6199,6 @@
                         </a:rPr>
                         <a:t>Indicators – Malware Artifacts</a:t>
                       </a:r>
-                      <a:endParaRPr lang="en-US" sz="1100" b="0" dirty="0" smtClean="0">
-                        <a:solidFill>
-                          <a:schemeClr val="tx1">
-                            <a:lumMod val="95000"/>
-                            <a:lumOff val="5000"/>
-                          </a:schemeClr>
-                        </a:solidFill>
-                      </a:endParaRPr>
                     </a:p>
                   </a:txBody>
                   <a:tcPr>
@@ -6126,9 +6212,7 @@
                       <a:tailEnd type="none" w="med" len="med"/>
                     </a:lnL>
                     <a:lnR w="12700" cap="flat" cmpd="sng" algn="ctr">
-                      <a:solidFill>
-                        <a:schemeClr val="tx1"/>
-                      </a:solidFill>
+                      <a:noFill/>
                       <a:prstDash val="solid"/>
                       <a:round/>
                       <a:headEnd type="none" w="med" len="med"/>
@@ -6184,7 +6268,24 @@
                       </a:endParaRPr>
                     </a:p>
                   </a:txBody>
-                  <a:tcPr/>
+                  <a:tcPr>
+                    <a:lnL w="12700" cap="flat" cmpd="sng" algn="ctr">
+                      <a:noFill/>
+                      <a:prstDash val="solid"/>
+                      <a:round/>
+                      <a:headEnd type="none" w="med" len="med"/>
+                      <a:tailEnd type="none" w="med" len="med"/>
+                    </a:lnL>
+                    <a:lnR w="12700" cap="flat" cmpd="sng" algn="ctr">
+                      <a:solidFill>
+                        <a:schemeClr val="tx1"/>
+                      </a:solidFill>
+                      <a:prstDash val="solid"/>
+                      <a:round/>
+                      <a:headEnd type="none" w="med" len="med"/>
+                      <a:tailEnd type="none" w="med" len="med"/>
+                    </a:lnR>
+                  </a:tcPr>
                 </a:tc>
               </a:tr>
               <a:tr h="0">

</xml_diff>